<commit_message>
added pdf version of final pptx
</commit_message>
<xml_diff>
--- a/3_Interim Project Presentation/Interim Project Presentation - 두리번두리번.pptx
+++ b/3_Interim Project Presentation/Interim Project Presentation - 두리번두리번.pptx
@@ -5,7 +5,7 @@
     <p:sldMasterId id="2147483648" r:id="rId1"/>
   </p:sldMasterIdLst>
   <p:notesMasterIdLst>
-    <p:notesMasterId r:id="rId16"/>
+    <p:notesMasterId r:id="rId19"/>
   </p:notesMasterIdLst>
   <p:sldIdLst>
     <p:sldId id="256" r:id="rId2"/>
@@ -22,6 +22,9 @@
     <p:sldId id="268" r:id="rId13"/>
     <p:sldId id="269" r:id="rId14"/>
     <p:sldId id="270" r:id="rId15"/>
+    <p:sldId id="275" r:id="rId16"/>
+    <p:sldId id="272" r:id="rId17"/>
+    <p:sldId id="273" r:id="rId18"/>
   </p:sldIdLst>
   <p:sldSz cx="12192000" cy="6858000"/>
   <p:notesSz cx="6858000" cy="9144000"/>
@@ -210,7 +213,7 @@
           <a:p>
             <a:fld id="{CAE244D8-87F9-4A82-9A7F-A988436C03F2}" type="datetimeFigureOut">
               <a:rPr lang="ko-KR" altLang="en-US" smtClean="0"/>
-              <a:t>2020-10-26</a:t>
+              <a:t>2020-10-27</a:t>
             </a:fld>
             <a:endParaRPr lang="ko-KR" altLang="en-US"/>
           </a:p>
@@ -839,6 +842,79 @@
               <a:defRPr/>
             </a:pPr>
             <a:r>
+              <a:rPr lang="ko-KR" altLang="en-US" sz="1800" dirty="0">
+                <a:effectLst/>
+                <a:latin typeface="맑은 고딕" panose="020B0503020000020004" pitchFamily="50" charset="-127"/>
+                <a:ea typeface="맑은 고딕" panose="020B0503020000020004" pitchFamily="50" charset="-127"/>
+                <a:cs typeface="Times New Roman" panose="02020603050405020304" pitchFamily="18" charset="0"/>
+              </a:rPr>
+              <a:t>지금부터는 저희 서비스를 개발하기 위해 수립한 정책과 관련한 설명을 드리겠습니다</a:t>
+            </a:r>
+            <a:r>
+              <a:rPr lang="en-US" altLang="ko-KR" sz="1800" dirty="0">
+                <a:effectLst/>
+                <a:latin typeface="맑은 고딕" panose="020B0503020000020004" pitchFamily="50" charset="-127"/>
+                <a:ea typeface="맑은 고딕" panose="020B0503020000020004" pitchFamily="50" charset="-127"/>
+                <a:cs typeface="Times New Roman" panose="02020603050405020304" pitchFamily="18" charset="0"/>
+              </a:rPr>
+              <a:t>. </a:t>
+            </a:r>
+            <a:r>
+              <a:rPr lang="ko-KR" altLang="en-US" sz="1800" dirty="0">
+                <a:effectLst/>
+                <a:latin typeface="맑은 고딕" panose="020B0503020000020004" pitchFamily="50" charset="-127"/>
+                <a:ea typeface="맑은 고딕" panose="020B0503020000020004" pitchFamily="50" charset="-127"/>
+                <a:cs typeface="Times New Roman" panose="02020603050405020304" pitchFamily="18" charset="0"/>
+              </a:rPr>
+              <a:t>첫번째로는 </a:t>
+            </a:r>
+            <a:r>
+              <a:rPr lang="en-US" altLang="ko-KR" sz="1800" dirty="0">
+                <a:effectLst/>
+                <a:latin typeface="맑은 고딕" panose="020B0503020000020004" pitchFamily="50" charset="-127"/>
+                <a:ea typeface="맑은 고딕" panose="020B0503020000020004" pitchFamily="50" charset="-127"/>
+                <a:cs typeface="Times New Roman" panose="02020603050405020304" pitchFamily="18" charset="0"/>
+              </a:rPr>
+              <a:t>Use case</a:t>
+            </a:r>
+            <a:r>
+              <a:rPr lang="ko-KR" altLang="en-US" sz="1800" dirty="0">
+                <a:effectLst/>
+                <a:latin typeface="맑은 고딕" panose="020B0503020000020004" pitchFamily="50" charset="-127"/>
+                <a:ea typeface="맑은 고딕" panose="020B0503020000020004" pitchFamily="50" charset="-127"/>
+                <a:cs typeface="Times New Roman" panose="02020603050405020304" pitchFamily="18" charset="0"/>
+              </a:rPr>
+              <a:t>입니다</a:t>
+            </a:r>
+            <a:r>
+              <a:rPr lang="en-US" altLang="ko-KR" sz="1800" dirty="0">
+                <a:effectLst/>
+                <a:latin typeface="맑은 고딕" panose="020B0503020000020004" pitchFamily="50" charset="-127"/>
+                <a:ea typeface="맑은 고딕" panose="020B0503020000020004" pitchFamily="50" charset="-127"/>
+                <a:cs typeface="Times New Roman" panose="02020603050405020304" pitchFamily="18" charset="0"/>
+              </a:rPr>
+              <a:t>.</a:t>
+            </a:r>
+          </a:p>
+          <a:p>
+            <a:pPr marL="0" marR="0" lvl="0" indent="0" algn="l" defTabSz="914400" rtl="0" eaLnBrk="1" fontAlgn="auto" latinLnBrk="1" hangingPunct="1">
+              <a:lnSpc>
+                <a:spcPct val="100000"/>
+              </a:lnSpc>
+              <a:spcBef>
+                <a:spcPts val="0"/>
+              </a:spcBef>
+              <a:spcAft>
+                <a:spcPts val="0"/>
+              </a:spcAft>
+              <a:buClrTx/>
+              <a:buSzTx/>
+              <a:buFontTx/>
+              <a:buNone/>
+              <a:tabLst/>
+              <a:defRPr/>
+            </a:pPr>
+            <a:r>
               <a:rPr lang="ko-KR" altLang="ko-KR" sz="1800" dirty="0">
                 <a:effectLst/>
                 <a:latin typeface="맑은 고딕" panose="020B0503020000020004" pitchFamily="50" charset="-127"/>
@@ -863,7 +939,25 @@
                 <a:ea typeface="맑은 고딕" panose="020B0503020000020004" pitchFamily="50" charset="-127"/>
                 <a:cs typeface="Times New Roman" panose="02020603050405020304" pitchFamily="18" charset="0"/>
               </a:rPr>
-              <a:t>는 당연 손 세정제 관리를 담당하는 사람입니다. </a:t>
+              <a:t>는 당연 손 세정제 관리를 담당하는 사람</a:t>
+            </a:r>
+            <a:r>
+              <a:rPr lang="ko-KR" altLang="en-US" sz="1800" dirty="0">
+                <a:effectLst/>
+                <a:latin typeface="맑은 고딕" panose="020B0503020000020004" pitchFamily="50" charset="-127"/>
+                <a:ea typeface="맑은 고딕" panose="020B0503020000020004" pitchFamily="50" charset="-127"/>
+                <a:cs typeface="Times New Roman" panose="02020603050405020304" pitchFamily="18" charset="0"/>
+              </a:rPr>
+              <a:t>일 것입니다</a:t>
+            </a:r>
+            <a:r>
+              <a:rPr lang="ko-KR" altLang="ko-KR" sz="1800" dirty="0">
+                <a:effectLst/>
+                <a:latin typeface="맑은 고딕" panose="020B0503020000020004" pitchFamily="50" charset="-127"/>
+                <a:ea typeface="맑은 고딕" panose="020B0503020000020004" pitchFamily="50" charset="-127"/>
+                <a:cs typeface="Times New Roman" panose="02020603050405020304" pitchFamily="18" charset="0"/>
+              </a:rPr>
+              <a:t>. </a:t>
             </a:r>
             <a:r>
               <a:rPr lang="ko-KR" altLang="en-US" sz="1800" dirty="0">
@@ -3484,6 +3578,443 @@
     <p:extLst>
       <p:ext uri="{BB962C8B-B14F-4D97-AF65-F5344CB8AC3E}">
         <p14:creationId xmlns:p14="http://schemas.microsoft.com/office/powerpoint/2010/main" val="3105719577"/>
+      </p:ext>
+    </p:extLst>
+  </p:cSld>
+  <p:clrMapOvr>
+    <a:masterClrMapping/>
+  </p:clrMapOvr>
+</p:notes>
+</file>
+
+<file path=ppt/notesSlides/notesSlide15.xml><?xml version="1.0" encoding="utf-8"?>
+<p:notes xmlns:a="http://schemas.openxmlformats.org/drawingml/2006/main" xmlns:r="http://schemas.openxmlformats.org/officeDocument/2006/relationships" xmlns:p="http://schemas.openxmlformats.org/presentationml/2006/main">
+  <p:cSld>
+    <p:spTree>
+      <p:nvGrpSpPr>
+        <p:cNvPr id="1" name=""/>
+        <p:cNvGrpSpPr/>
+        <p:nvPr/>
+      </p:nvGrpSpPr>
+      <p:grpSpPr>
+        <a:xfrm>
+          <a:off x="0" y="0"/>
+          <a:ext cx="0" cy="0"/>
+          <a:chOff x="0" y="0"/>
+          <a:chExt cx="0" cy="0"/>
+        </a:xfrm>
+      </p:grpSpPr>
+      <p:sp>
+        <p:nvSpPr>
+          <p:cNvPr id="2" name="슬라이드 이미지 개체 틀 1"/>
+          <p:cNvSpPr>
+            <a:spLocks noGrp="1" noRot="1" noChangeAspect="1"/>
+          </p:cNvSpPr>
+          <p:nvPr>
+            <p:ph type="sldImg"/>
+          </p:nvPr>
+        </p:nvSpPr>
+        <p:spPr/>
+      </p:sp>
+      <p:sp>
+        <p:nvSpPr>
+          <p:cNvPr id="3" name="슬라이드 노트 개체 틀 2"/>
+          <p:cNvSpPr>
+            <a:spLocks noGrp="1"/>
+          </p:cNvSpPr>
+          <p:nvPr>
+            <p:ph type="body" idx="1"/>
+          </p:nvPr>
+        </p:nvSpPr>
+        <p:spPr/>
+        <p:txBody>
+          <a:bodyPr/>
+          <a:lstStyle/>
+          <a:p>
+            <a:pPr algn="just" latinLnBrk="1">
+              <a:lnSpc>
+                <a:spcPct val="107000"/>
+              </a:lnSpc>
+              <a:spcAft>
+                <a:spcPts val="800"/>
+              </a:spcAft>
+            </a:pPr>
+            <a:r>
+              <a:rPr lang="ko-KR" altLang="en-US" sz="1800" kern="100" dirty="0">
+                <a:effectLst/>
+                <a:latin typeface="맑은 고딕" panose="020B0503020000020004" pitchFamily="50" charset="-127"/>
+                <a:ea typeface="맑은 고딕" panose="020B0503020000020004" pitchFamily="50" charset="-127"/>
+                <a:cs typeface="Times New Roman" panose="02020603050405020304" pitchFamily="18" charset="0"/>
+              </a:rPr>
+              <a:t>지금까지의 과정을 한 다이어그램을 표현하면</a:t>
+            </a:r>
+            <a:r>
+              <a:rPr lang="en-US" altLang="ko-KR" sz="1800" kern="100" dirty="0">
+                <a:effectLst/>
+                <a:latin typeface="맑은 고딕" panose="020B0503020000020004" pitchFamily="50" charset="-127"/>
+                <a:ea typeface="맑은 고딕" panose="020B0503020000020004" pitchFamily="50" charset="-127"/>
+                <a:cs typeface="Times New Roman" panose="02020603050405020304" pitchFamily="18" charset="0"/>
+              </a:rPr>
+              <a:t> </a:t>
+            </a:r>
+            <a:r>
+              <a:rPr lang="ko-KR" altLang="en-US" sz="1800" kern="100" dirty="0">
+                <a:effectLst/>
+                <a:latin typeface="맑은 고딕" panose="020B0503020000020004" pitchFamily="50" charset="-127"/>
+                <a:ea typeface="맑은 고딕" panose="020B0503020000020004" pitchFamily="50" charset="-127"/>
+                <a:cs typeface="Times New Roman" panose="02020603050405020304" pitchFamily="18" charset="0"/>
+              </a:rPr>
+              <a:t>이와 같은 </a:t>
+            </a:r>
+            <a:r>
+              <a:rPr lang="en-US" altLang="ko-KR" sz="1800" kern="100" dirty="0">
+                <a:effectLst/>
+                <a:latin typeface="맑은 고딕" panose="020B0503020000020004" pitchFamily="50" charset="-127"/>
+                <a:ea typeface="맑은 고딕" panose="020B0503020000020004" pitchFamily="50" charset="-127"/>
+                <a:cs typeface="Times New Roman" panose="02020603050405020304" pitchFamily="18" charset="0"/>
+              </a:rPr>
+              <a:t>flow</a:t>
+            </a:r>
+            <a:r>
+              <a:rPr lang="ko-KR" altLang="en-US" sz="1800" kern="100" dirty="0">
+                <a:effectLst/>
+                <a:latin typeface="맑은 고딕" panose="020B0503020000020004" pitchFamily="50" charset="-127"/>
+                <a:ea typeface="맑은 고딕" panose="020B0503020000020004" pitchFamily="50" charset="-127"/>
+                <a:cs typeface="Times New Roman" panose="02020603050405020304" pitchFamily="18" charset="0"/>
+              </a:rPr>
+              <a:t>를 갖게 됩니다</a:t>
+            </a:r>
+            <a:r>
+              <a:rPr lang="en-US" altLang="ko-KR" sz="1800" kern="100" dirty="0">
+                <a:effectLst/>
+                <a:latin typeface="맑은 고딕" panose="020B0503020000020004" pitchFamily="50" charset="-127"/>
+                <a:ea typeface="맑은 고딕" panose="020B0503020000020004" pitchFamily="50" charset="-127"/>
+                <a:cs typeface="Times New Roman" panose="02020603050405020304" pitchFamily="18" charset="0"/>
+              </a:rPr>
+              <a:t>.</a:t>
+            </a:r>
+          </a:p>
+        </p:txBody>
+      </p:sp>
+      <p:sp>
+        <p:nvSpPr>
+          <p:cNvPr id="4" name="슬라이드 번호 개체 틀 3"/>
+          <p:cNvSpPr>
+            <a:spLocks noGrp="1"/>
+          </p:cNvSpPr>
+          <p:nvPr>
+            <p:ph type="sldNum" sz="quarter" idx="5"/>
+          </p:nvPr>
+        </p:nvSpPr>
+        <p:spPr/>
+        <p:txBody>
+          <a:bodyPr/>
+          <a:lstStyle/>
+          <a:p>
+            <a:fld id="{CFEC5C64-9846-41DF-88A9-FAC22ECF479C}" type="slidenum">
+              <a:rPr lang="ko-KR" altLang="en-US" smtClean="0"/>
+              <a:t>15</a:t>
+            </a:fld>
+            <a:endParaRPr lang="ko-KR" altLang="en-US"/>
+          </a:p>
+        </p:txBody>
+      </p:sp>
+    </p:spTree>
+    <p:extLst>
+      <p:ext uri="{BB962C8B-B14F-4D97-AF65-F5344CB8AC3E}">
+        <p14:creationId xmlns:p14="http://schemas.microsoft.com/office/powerpoint/2010/main" val="2099295813"/>
+      </p:ext>
+    </p:extLst>
+  </p:cSld>
+  <p:clrMapOvr>
+    <a:masterClrMapping/>
+  </p:clrMapOvr>
+</p:notes>
+</file>
+
+<file path=ppt/notesSlides/notesSlide16.xml><?xml version="1.0" encoding="utf-8"?>
+<p:notes xmlns:a="http://schemas.openxmlformats.org/drawingml/2006/main" xmlns:r="http://schemas.openxmlformats.org/officeDocument/2006/relationships" xmlns:p="http://schemas.openxmlformats.org/presentationml/2006/main">
+  <p:cSld>
+    <p:spTree>
+      <p:nvGrpSpPr>
+        <p:cNvPr id="1" name=""/>
+        <p:cNvGrpSpPr/>
+        <p:nvPr/>
+      </p:nvGrpSpPr>
+      <p:grpSpPr>
+        <a:xfrm>
+          <a:off x="0" y="0"/>
+          <a:ext cx="0" cy="0"/>
+          <a:chOff x="0" y="0"/>
+          <a:chExt cx="0" cy="0"/>
+        </a:xfrm>
+      </p:grpSpPr>
+      <p:sp>
+        <p:nvSpPr>
+          <p:cNvPr id="2" name="슬라이드 이미지 개체 틀 1"/>
+          <p:cNvSpPr>
+            <a:spLocks noGrp="1" noRot="1" noChangeAspect="1"/>
+          </p:cNvSpPr>
+          <p:nvPr>
+            <p:ph type="sldImg"/>
+          </p:nvPr>
+        </p:nvSpPr>
+        <p:spPr/>
+      </p:sp>
+      <p:sp>
+        <p:nvSpPr>
+          <p:cNvPr id="3" name="슬라이드 노트 개체 틀 2"/>
+          <p:cNvSpPr>
+            <a:spLocks noGrp="1"/>
+          </p:cNvSpPr>
+          <p:nvPr>
+            <p:ph type="body" idx="1"/>
+          </p:nvPr>
+        </p:nvSpPr>
+        <p:spPr/>
+        <p:txBody>
+          <a:bodyPr/>
+          <a:lstStyle/>
+          <a:p>
+            <a:pPr algn="just" latinLnBrk="1">
+              <a:lnSpc>
+                <a:spcPct val="107000"/>
+              </a:lnSpc>
+              <a:spcAft>
+                <a:spcPts val="800"/>
+              </a:spcAft>
+            </a:pPr>
+            <a:r>
+              <a:rPr lang="ko-KR" altLang="en-US" sz="1800" kern="100" dirty="0">
+                <a:effectLst/>
+                <a:latin typeface="맑은 고딕" panose="020B0503020000020004" pitchFamily="50" charset="-127"/>
+                <a:ea typeface="맑은 고딕" panose="020B0503020000020004" pitchFamily="50" charset="-127"/>
+                <a:cs typeface="Times New Roman" panose="02020603050405020304" pitchFamily="18" charset="0"/>
+              </a:rPr>
+              <a:t>마지막으로 저희 프로젝트의 현재 진행 과정은 이와 같습니다</a:t>
+            </a:r>
+            <a:r>
+              <a:rPr lang="en-US" altLang="ko-KR" sz="1800" kern="100" dirty="0">
+                <a:effectLst/>
+                <a:latin typeface="맑은 고딕" panose="020B0503020000020004" pitchFamily="50" charset="-127"/>
+                <a:ea typeface="맑은 고딕" panose="020B0503020000020004" pitchFamily="50" charset="-127"/>
+                <a:cs typeface="Times New Roman" panose="02020603050405020304" pitchFamily="18" charset="0"/>
+              </a:rPr>
+              <a:t>.</a:t>
+            </a:r>
+          </a:p>
+          <a:p>
+            <a:pPr algn="just" latinLnBrk="1">
+              <a:lnSpc>
+                <a:spcPct val="107000"/>
+              </a:lnSpc>
+              <a:spcAft>
+                <a:spcPts val="800"/>
+              </a:spcAft>
+            </a:pPr>
+            <a:r>
+              <a:rPr lang="ko-KR" altLang="en-US" sz="1800" kern="100" dirty="0">
+                <a:effectLst/>
+                <a:latin typeface="맑은 고딕" panose="020B0503020000020004" pitchFamily="50" charset="-127"/>
+                <a:ea typeface="맑은 고딕" panose="020B0503020000020004" pitchFamily="50" charset="-127"/>
+                <a:cs typeface="Times New Roman" panose="02020603050405020304" pitchFamily="18" charset="0"/>
+              </a:rPr>
+              <a:t>앞으로 데이터베이스와 서비스 플랫폼을 설계하여 이들을 원활하게 연결함으로써 저희가 목표했던 서비스를 최종 개발하는 것이 앞으로의 계획입니다</a:t>
+            </a:r>
+            <a:r>
+              <a:rPr lang="en-US" altLang="ko-KR" sz="1800" kern="100" dirty="0">
+                <a:effectLst/>
+                <a:latin typeface="맑은 고딕" panose="020B0503020000020004" pitchFamily="50" charset="-127"/>
+                <a:ea typeface="맑은 고딕" panose="020B0503020000020004" pitchFamily="50" charset="-127"/>
+                <a:cs typeface="Times New Roman" panose="02020603050405020304" pitchFamily="18" charset="0"/>
+              </a:rPr>
+              <a:t>.</a:t>
+            </a:r>
+          </a:p>
+        </p:txBody>
+      </p:sp>
+      <p:sp>
+        <p:nvSpPr>
+          <p:cNvPr id="4" name="슬라이드 번호 개체 틀 3"/>
+          <p:cNvSpPr>
+            <a:spLocks noGrp="1"/>
+          </p:cNvSpPr>
+          <p:nvPr>
+            <p:ph type="sldNum" sz="quarter" idx="5"/>
+          </p:nvPr>
+        </p:nvSpPr>
+        <p:spPr/>
+        <p:txBody>
+          <a:bodyPr/>
+          <a:lstStyle/>
+          <a:p>
+            <a:fld id="{CFEC5C64-9846-41DF-88A9-FAC22ECF479C}" type="slidenum">
+              <a:rPr lang="ko-KR" altLang="en-US" smtClean="0"/>
+              <a:t>16</a:t>
+            </a:fld>
+            <a:endParaRPr lang="ko-KR" altLang="en-US"/>
+          </a:p>
+        </p:txBody>
+      </p:sp>
+    </p:spTree>
+    <p:extLst>
+      <p:ext uri="{BB962C8B-B14F-4D97-AF65-F5344CB8AC3E}">
+        <p14:creationId xmlns:p14="http://schemas.microsoft.com/office/powerpoint/2010/main" val="4093523170"/>
+      </p:ext>
+    </p:extLst>
+  </p:cSld>
+  <p:clrMapOvr>
+    <a:masterClrMapping/>
+  </p:clrMapOvr>
+</p:notes>
+</file>
+
+<file path=ppt/notesSlides/notesSlide17.xml><?xml version="1.0" encoding="utf-8"?>
+<p:notes xmlns:a="http://schemas.openxmlformats.org/drawingml/2006/main" xmlns:r="http://schemas.openxmlformats.org/officeDocument/2006/relationships" xmlns:p="http://schemas.openxmlformats.org/presentationml/2006/main">
+  <p:cSld>
+    <p:spTree>
+      <p:nvGrpSpPr>
+        <p:cNvPr id="1" name=""/>
+        <p:cNvGrpSpPr/>
+        <p:nvPr/>
+      </p:nvGrpSpPr>
+      <p:grpSpPr>
+        <a:xfrm>
+          <a:off x="0" y="0"/>
+          <a:ext cx="0" cy="0"/>
+          <a:chOff x="0" y="0"/>
+          <a:chExt cx="0" cy="0"/>
+        </a:xfrm>
+      </p:grpSpPr>
+      <p:sp>
+        <p:nvSpPr>
+          <p:cNvPr id="2" name="슬라이드 이미지 개체 틀 1"/>
+          <p:cNvSpPr>
+            <a:spLocks noGrp="1" noRot="1" noChangeAspect="1"/>
+          </p:cNvSpPr>
+          <p:nvPr>
+            <p:ph type="sldImg"/>
+          </p:nvPr>
+        </p:nvSpPr>
+        <p:spPr/>
+      </p:sp>
+      <p:sp>
+        <p:nvSpPr>
+          <p:cNvPr id="3" name="슬라이드 노트 개체 틀 2"/>
+          <p:cNvSpPr>
+            <a:spLocks noGrp="1"/>
+          </p:cNvSpPr>
+          <p:nvPr>
+            <p:ph type="body" idx="1"/>
+          </p:nvPr>
+        </p:nvSpPr>
+        <p:spPr/>
+        <p:txBody>
+          <a:bodyPr/>
+          <a:lstStyle/>
+          <a:p>
+            <a:pPr algn="just" latinLnBrk="1">
+              <a:lnSpc>
+                <a:spcPct val="107000"/>
+              </a:lnSpc>
+              <a:spcAft>
+                <a:spcPts val="800"/>
+              </a:spcAft>
+            </a:pPr>
+            <a:r>
+              <a:rPr lang="ko-KR" altLang="en-US" sz="1800" kern="100" dirty="0">
+                <a:effectLst/>
+                <a:latin typeface="맑은 고딕" panose="020B0503020000020004" pitchFamily="50" charset="-127"/>
+                <a:ea typeface="맑은 고딕" panose="020B0503020000020004" pitchFamily="50" charset="-127"/>
+                <a:cs typeface="Times New Roman" panose="02020603050405020304" pitchFamily="18" charset="0"/>
+              </a:rPr>
+              <a:t>지금까지 </a:t>
+            </a:r>
+            <a:r>
+              <a:rPr lang="en-US" altLang="ko-KR" sz="1800" kern="100" dirty="0">
+                <a:effectLst/>
+                <a:latin typeface="맑은 고딕" panose="020B0503020000020004" pitchFamily="50" charset="-127"/>
+                <a:ea typeface="맑은 고딕" panose="020B0503020000020004" pitchFamily="50" charset="-127"/>
+                <a:cs typeface="Times New Roman" panose="02020603050405020304" pitchFamily="18" charset="0"/>
+              </a:rPr>
+              <a:t>Team 1</a:t>
+            </a:r>
+            <a:r>
+              <a:rPr lang="ko-KR" altLang="en-US" sz="1800" kern="100" dirty="0">
+                <a:effectLst/>
+                <a:latin typeface="맑은 고딕" panose="020B0503020000020004" pitchFamily="50" charset="-127"/>
+                <a:ea typeface="맑은 고딕" panose="020B0503020000020004" pitchFamily="50" charset="-127"/>
+                <a:cs typeface="Times New Roman" panose="02020603050405020304" pitchFamily="18" charset="0"/>
+              </a:rPr>
+              <a:t>의 중간 발표 마치겠습니다</a:t>
+            </a:r>
+            <a:r>
+              <a:rPr lang="en-US" altLang="ko-KR" sz="1800" kern="100" dirty="0">
+                <a:effectLst/>
+                <a:latin typeface="맑은 고딕" panose="020B0503020000020004" pitchFamily="50" charset="-127"/>
+                <a:ea typeface="맑은 고딕" panose="020B0503020000020004" pitchFamily="50" charset="-127"/>
+                <a:cs typeface="Times New Roman" panose="02020603050405020304" pitchFamily="18" charset="0"/>
+              </a:rPr>
+              <a:t>.</a:t>
+            </a:r>
+          </a:p>
+          <a:p>
+            <a:pPr algn="just" latinLnBrk="1">
+              <a:lnSpc>
+                <a:spcPct val="107000"/>
+              </a:lnSpc>
+              <a:spcAft>
+                <a:spcPts val="800"/>
+              </a:spcAft>
+            </a:pPr>
+            <a:r>
+              <a:rPr lang="ko-KR" altLang="en-US" sz="1800" kern="100" dirty="0">
+                <a:effectLst/>
+                <a:latin typeface="맑은 고딕" panose="020B0503020000020004" pitchFamily="50" charset="-127"/>
+                <a:ea typeface="맑은 고딕" panose="020B0503020000020004" pitchFamily="50" charset="-127"/>
+                <a:cs typeface="Times New Roman" panose="02020603050405020304" pitchFamily="18" charset="0"/>
+              </a:rPr>
+              <a:t>감사합니다</a:t>
+            </a:r>
+            <a:r>
+              <a:rPr lang="en-US" altLang="ko-KR" sz="1800" kern="100" dirty="0">
+                <a:effectLst/>
+                <a:latin typeface="맑은 고딕" panose="020B0503020000020004" pitchFamily="50" charset="-127"/>
+                <a:ea typeface="맑은 고딕" panose="020B0503020000020004" pitchFamily="50" charset="-127"/>
+                <a:cs typeface="Times New Roman" panose="02020603050405020304" pitchFamily="18" charset="0"/>
+              </a:rPr>
+              <a:t>.</a:t>
+            </a:r>
+          </a:p>
+        </p:txBody>
+      </p:sp>
+      <p:sp>
+        <p:nvSpPr>
+          <p:cNvPr id="4" name="슬라이드 번호 개체 틀 3"/>
+          <p:cNvSpPr>
+            <a:spLocks noGrp="1"/>
+          </p:cNvSpPr>
+          <p:nvPr>
+            <p:ph type="sldNum" sz="quarter" idx="5"/>
+          </p:nvPr>
+        </p:nvSpPr>
+        <p:spPr/>
+        <p:txBody>
+          <a:bodyPr/>
+          <a:lstStyle/>
+          <a:p>
+            <a:fld id="{CFEC5C64-9846-41DF-88A9-FAC22ECF479C}" type="slidenum">
+              <a:rPr lang="ko-KR" altLang="en-US" smtClean="0"/>
+              <a:t>17</a:t>
+            </a:fld>
+            <a:endParaRPr lang="ko-KR" altLang="en-US"/>
+          </a:p>
+        </p:txBody>
+      </p:sp>
+    </p:spTree>
+    <p:extLst>
+      <p:ext uri="{BB962C8B-B14F-4D97-AF65-F5344CB8AC3E}">
+        <p14:creationId xmlns:p14="http://schemas.microsoft.com/office/powerpoint/2010/main" val="2900098115"/>
       </p:ext>
     </p:extLst>
   </p:cSld>
@@ -4930,7 +5461,7 @@
           <a:p>
             <a:fld id="{7197A083-76BA-49CA-BB32-BD7943E08EBB}" type="datetime1">
               <a:rPr lang="ko-KR" altLang="en-US" smtClean="0"/>
-              <a:t>2020-10-26</a:t>
+              <a:t>2020-10-27</a:t>
             </a:fld>
             <a:endParaRPr lang="ko-KR" altLang="en-US"/>
           </a:p>
@@ -5170,7 +5701,7 @@
           <a:p>
             <a:fld id="{51BD7EAD-C81D-4805-8039-C3D3B9DD6EC1}" type="datetime1">
               <a:rPr lang="ko-KR" altLang="en-US" smtClean="0"/>
-              <a:t>2020-10-26</a:t>
+              <a:t>2020-10-27</a:t>
             </a:fld>
             <a:endParaRPr lang="ko-KR" altLang="en-US"/>
           </a:p>
@@ -5413,7 +5944,7 @@
           <a:p>
             <a:fld id="{6ED4B718-156F-4F1B-AF1E-F81FDBE32FE9}" type="datetime1">
               <a:rPr lang="ko-KR" altLang="en-US" smtClean="0"/>
-              <a:t>2020-10-26</a:t>
+              <a:t>2020-10-27</a:t>
             </a:fld>
             <a:endParaRPr lang="ko-KR" altLang="en-US"/>
           </a:p>
@@ -5646,7 +6177,7 @@
           <a:p>
             <a:fld id="{1170B75A-FA6C-4151-ADE2-F942388B6A78}" type="datetime1">
               <a:rPr lang="ko-KR" altLang="en-US" smtClean="0"/>
-              <a:t>2020-10-26</a:t>
+              <a:t>2020-10-27</a:t>
             </a:fld>
             <a:endParaRPr lang="ko-KR" altLang="en-US"/>
           </a:p>
@@ -5956,7 +6487,7 @@
           <a:p>
             <a:fld id="{3BD28081-0DFE-4CC6-9E7F-2F9EF6B0B7B7}" type="datetime1">
               <a:rPr lang="ko-KR" altLang="en-US" smtClean="0"/>
-              <a:t>2020-10-26</a:t>
+              <a:t>2020-10-27</a:t>
             </a:fld>
             <a:endParaRPr lang="ko-KR" altLang="en-US"/>
           </a:p>
@@ -6256,7 +6787,7 @@
           <a:p>
             <a:fld id="{AF44C2A0-723E-4DFD-B5A2-B62A0B8CF913}" type="datetime1">
               <a:rPr lang="ko-KR" altLang="en-US" smtClean="0"/>
-              <a:t>2020-10-26</a:t>
+              <a:t>2020-10-27</a:t>
             </a:fld>
             <a:endParaRPr lang="ko-KR" altLang="en-US"/>
           </a:p>
@@ -6703,7 +7234,7 @@
           <a:p>
             <a:fld id="{3D7A3139-C291-4F6D-B506-80349A2CE843}" type="datetime1">
               <a:rPr lang="ko-KR" altLang="en-US" smtClean="0"/>
-              <a:t>2020-10-26</a:t>
+              <a:t>2020-10-27</a:t>
             </a:fld>
             <a:endParaRPr lang="ko-KR" altLang="en-US"/>
           </a:p>
@@ -6879,7 +7410,7 @@
           <a:p>
             <a:fld id="{AC3A54A4-1D9A-4EA4-83C9-032C7558E97A}" type="datetime1">
               <a:rPr lang="ko-KR" altLang="en-US" smtClean="0"/>
-              <a:t>2020-10-26</a:t>
+              <a:t>2020-10-27</a:t>
             </a:fld>
             <a:endParaRPr lang="ko-KR" altLang="en-US"/>
           </a:p>
@@ -7027,7 +7558,7 @@
           <a:p>
             <a:fld id="{29F12B2F-7FA6-450F-99FE-04774F19F559}" type="datetime1">
               <a:rPr lang="ko-KR" altLang="en-US" smtClean="0"/>
-              <a:t>2020-10-26</a:t>
+              <a:t>2020-10-27</a:t>
             </a:fld>
             <a:endParaRPr lang="ko-KR" altLang="en-US"/>
           </a:p>
@@ -7373,7 +7904,7 @@
           <a:p>
             <a:fld id="{F5789761-A2A5-4DD2-A541-0B2333F1A735}" type="datetime1">
               <a:rPr lang="ko-KR" altLang="en-US" smtClean="0"/>
-              <a:t>2020-10-26</a:t>
+              <a:t>2020-10-27</a:t>
             </a:fld>
             <a:endParaRPr lang="ko-KR" altLang="en-US"/>
           </a:p>
@@ -7696,7 +8227,7 @@
           <a:p>
             <a:fld id="{66B08EFB-003F-47D8-BBB5-74494BE53C42}" type="datetime1">
               <a:rPr lang="ko-KR" altLang="en-US" smtClean="0"/>
-              <a:t>2020-10-26</a:t>
+              <a:t>2020-10-27</a:t>
             </a:fld>
             <a:endParaRPr lang="ko-KR" altLang="en-US"/>
           </a:p>
@@ -7964,7 +8495,7 @@
           <a:p>
             <a:fld id="{1D56028A-F832-41DB-8E61-55343315335C}" type="datetime1">
               <a:rPr lang="ko-KR" altLang="en-US" smtClean="0"/>
-              <a:t>2020-10-26</a:t>
+              <a:t>2020-10-27</a:t>
             </a:fld>
             <a:endParaRPr lang="ko-KR" altLang="en-US"/>
           </a:p>
@@ -10592,13 +11123,13 @@
   <p:clrMapOvr>
     <a:masterClrMapping/>
   </p:clrMapOvr>
-  <mc:AlternateContent xmlns:mc="http://schemas.openxmlformats.org/markup-compatibility/2006">
-    <mc:Choice xmlns:p14="http://schemas.microsoft.com/office/powerpoint/2010/main" Requires="p14">
+  <mc:AlternateContent xmlns:mc="http://schemas.openxmlformats.org/markup-compatibility/2006" xmlns:p14="http://schemas.microsoft.com/office/powerpoint/2010/main">
+    <mc:Choice Requires="p14">
       <p:transition spd="med" p14:dur="700">
         <p:fade/>
       </p:transition>
     </mc:Choice>
-    <mc:Fallback>
+    <mc:Fallback xmlns="">
       <p:transition spd="med">
         <p:fade/>
       </p:transition>
@@ -11033,13 +11564,13 @@
   <p:clrMapOvr>
     <a:masterClrMapping/>
   </p:clrMapOvr>
-  <mc:AlternateContent xmlns:mc="http://schemas.openxmlformats.org/markup-compatibility/2006">
-    <mc:Choice xmlns:p14="http://schemas.microsoft.com/office/powerpoint/2010/main" Requires="p14">
+  <mc:AlternateContent xmlns:mc="http://schemas.openxmlformats.org/markup-compatibility/2006" xmlns:p14="http://schemas.microsoft.com/office/powerpoint/2010/main">
+    <mc:Choice Requires="p14">
       <p:transition spd="med" p14:dur="700">
         <p:fade/>
       </p:transition>
     </mc:Choice>
-    <mc:Fallback>
+    <mc:Fallback xmlns="">
       <p:transition spd="med">
         <p:fade/>
       </p:transition>
@@ -11500,13 +12031,13 @@
   <p:clrMapOvr>
     <a:masterClrMapping/>
   </p:clrMapOvr>
-  <mc:AlternateContent xmlns:mc="http://schemas.openxmlformats.org/markup-compatibility/2006">
-    <mc:Choice xmlns:p14="http://schemas.microsoft.com/office/powerpoint/2010/main" Requires="p14">
+  <mc:AlternateContent xmlns:mc="http://schemas.openxmlformats.org/markup-compatibility/2006" xmlns:p14="http://schemas.microsoft.com/office/powerpoint/2010/main">
+    <mc:Choice Requires="p14">
       <p:transition spd="med" p14:dur="700">
         <p:fade/>
       </p:transition>
     </mc:Choice>
-    <mc:Fallback>
+    <mc:Fallback xmlns="">
       <p:transition spd="med">
         <p:fade/>
       </p:transition>
@@ -11967,13 +12498,1277 @@
   <p:clrMapOvr>
     <a:masterClrMapping/>
   </p:clrMapOvr>
-  <mc:AlternateContent xmlns:mc="http://schemas.openxmlformats.org/markup-compatibility/2006">
-    <mc:Choice xmlns:p14="http://schemas.microsoft.com/office/powerpoint/2010/main" Requires="p14">
+  <mc:AlternateContent xmlns:mc="http://schemas.openxmlformats.org/markup-compatibility/2006" xmlns:p14="http://schemas.microsoft.com/office/powerpoint/2010/main">
+    <mc:Choice Requires="p14">
       <p:transition spd="med" p14:dur="700">
         <p:fade/>
       </p:transition>
     </mc:Choice>
-    <mc:Fallback>
+    <mc:Fallback xmlns="">
+      <p:transition spd="med">
+        <p:fade/>
+      </p:transition>
+    </mc:Fallback>
+  </mc:AlternateContent>
+</p:sld>
+</file>
+
+<file path=ppt/slides/slide15.xml><?xml version="1.0" encoding="utf-8"?>
+<p:sld xmlns:a="http://schemas.openxmlformats.org/drawingml/2006/main" xmlns:r="http://schemas.openxmlformats.org/officeDocument/2006/relationships" xmlns:p="http://schemas.openxmlformats.org/presentationml/2006/main">
+  <p:cSld>
+    <p:spTree>
+      <p:nvGrpSpPr>
+        <p:cNvPr id="1" name=""/>
+        <p:cNvGrpSpPr/>
+        <p:nvPr/>
+      </p:nvGrpSpPr>
+      <p:grpSpPr>
+        <a:xfrm>
+          <a:off x="0" y="0"/>
+          <a:ext cx="0" cy="0"/>
+          <a:chOff x="0" y="0"/>
+          <a:chExt cx="0" cy="0"/>
+        </a:xfrm>
+      </p:grpSpPr>
+      <p:sp>
+        <p:nvSpPr>
+          <p:cNvPr id="4" name="TextBox 3">
+            <a:extLst>
+              <a:ext uri="{FF2B5EF4-FFF2-40B4-BE49-F238E27FC236}">
+                <a16:creationId xmlns:a16="http://schemas.microsoft.com/office/drawing/2014/main" id="{6AAAD052-7018-4B5E-ACE0-B4B9B5DADAA8}"/>
+              </a:ext>
+            </a:extLst>
+          </p:cNvPr>
+          <p:cNvSpPr txBox="1"/>
+          <p:nvPr/>
+        </p:nvSpPr>
+        <p:spPr>
+          <a:xfrm>
+            <a:off x="11545145" y="6453051"/>
+            <a:ext cx="559769" cy="307777"/>
+          </a:xfrm>
+          <a:prstGeom prst="rect">
+            <a:avLst/>
+          </a:prstGeom>
+          <a:noFill/>
+        </p:spPr>
+        <p:txBody>
+          <a:bodyPr wrap="none" rtlCol="0">
+            <a:spAutoFit/>
+          </a:bodyPr>
+          <a:lstStyle/>
+          <a:p>
+            <a:pPr algn="r"/>
+            <a:r>
+              <a:rPr lang="en-US" altLang="ko-KR" sz="1400" dirty="0">
+                <a:solidFill>
+                  <a:schemeClr val="tx1">
+                    <a:lumMod val="50000"/>
+                    <a:lumOff val="50000"/>
+                  </a:schemeClr>
+                </a:solidFill>
+                <a:latin typeface="카카오 Regular" panose="020B0600000101010101" pitchFamily="50" charset="-127"/>
+                <a:ea typeface="카카오 Regular" panose="020B0600000101010101" pitchFamily="50" charset="-127"/>
+              </a:rPr>
+              <a:t>p. 15</a:t>
+            </a:r>
+            <a:endParaRPr lang="ko-KR" altLang="en-US" sz="1400" dirty="0">
+              <a:solidFill>
+                <a:schemeClr val="tx1">
+                  <a:lumMod val="50000"/>
+                  <a:lumOff val="50000"/>
+                </a:schemeClr>
+              </a:solidFill>
+              <a:latin typeface="카카오 Regular" panose="020B0600000101010101" pitchFamily="50" charset="-127"/>
+              <a:ea typeface="카카오 Regular" panose="020B0600000101010101" pitchFamily="50" charset="-127"/>
+            </a:endParaRPr>
+          </a:p>
+        </p:txBody>
+      </p:sp>
+      <p:sp>
+        <p:nvSpPr>
+          <p:cNvPr id="5" name="TextBox 4">
+            <a:extLst>
+              <a:ext uri="{FF2B5EF4-FFF2-40B4-BE49-F238E27FC236}">
+                <a16:creationId xmlns:a16="http://schemas.microsoft.com/office/drawing/2014/main" id="{4954B042-D712-468F-8BF0-BB42376DFC5E}"/>
+              </a:ext>
+            </a:extLst>
+          </p:cNvPr>
+          <p:cNvSpPr txBox="1"/>
+          <p:nvPr/>
+        </p:nvSpPr>
+        <p:spPr>
+          <a:xfrm>
+            <a:off x="87086" y="6453051"/>
+            <a:ext cx="1356462" cy="307777"/>
+          </a:xfrm>
+          <a:prstGeom prst="rect">
+            <a:avLst/>
+          </a:prstGeom>
+          <a:noFill/>
+        </p:spPr>
+        <p:txBody>
+          <a:bodyPr wrap="none" rtlCol="0">
+            <a:spAutoFit/>
+          </a:bodyPr>
+          <a:lstStyle/>
+          <a:p>
+            <a:r>
+              <a:rPr lang="ko-KR" altLang="en-US" sz="1400" dirty="0">
+                <a:solidFill>
+                  <a:schemeClr val="tx1">
+                    <a:lumMod val="50000"/>
+                    <a:lumOff val="50000"/>
+                  </a:schemeClr>
+                </a:solidFill>
+                <a:latin typeface="카카오 Regular" panose="020B0600000101010101" pitchFamily="50" charset="-127"/>
+                <a:ea typeface="카카오 Regular" panose="020B0600000101010101" pitchFamily="50" charset="-127"/>
+              </a:rPr>
+              <a:t>오픈소스</a:t>
+            </a:r>
+            <a:r>
+              <a:rPr lang="en-US" altLang="ko-KR" sz="1400" dirty="0">
+                <a:solidFill>
+                  <a:schemeClr val="tx1">
+                    <a:lumMod val="50000"/>
+                    <a:lumOff val="50000"/>
+                  </a:schemeClr>
+                </a:solidFill>
+                <a:latin typeface="카카오 Regular" panose="020B0600000101010101" pitchFamily="50" charset="-127"/>
+                <a:ea typeface="카카오 Regular" panose="020B0600000101010101" pitchFamily="50" charset="-127"/>
+              </a:rPr>
+              <a:t>SW</a:t>
+            </a:r>
+            <a:r>
+              <a:rPr lang="ko-KR" altLang="en-US" sz="1400" dirty="0">
+                <a:solidFill>
+                  <a:schemeClr val="tx1">
+                    <a:lumMod val="50000"/>
+                    <a:lumOff val="50000"/>
+                  </a:schemeClr>
+                </a:solidFill>
+                <a:latin typeface="카카오 Regular" panose="020B0600000101010101" pitchFamily="50" charset="-127"/>
+                <a:ea typeface="카카오 Regular" panose="020B0600000101010101" pitchFamily="50" charset="-127"/>
+              </a:rPr>
+              <a:t>설계</a:t>
+            </a:r>
+          </a:p>
+        </p:txBody>
+      </p:sp>
+      <p:sp>
+        <p:nvSpPr>
+          <p:cNvPr id="6" name="TextBox 5">
+            <a:extLst>
+              <a:ext uri="{FF2B5EF4-FFF2-40B4-BE49-F238E27FC236}">
+                <a16:creationId xmlns:a16="http://schemas.microsoft.com/office/drawing/2014/main" id="{B3DB57B7-8AEA-41FC-94CD-E72818DD6FEF}"/>
+              </a:ext>
+            </a:extLst>
+          </p:cNvPr>
+          <p:cNvSpPr txBox="1"/>
+          <p:nvPr/>
+        </p:nvSpPr>
+        <p:spPr>
+          <a:xfrm>
+            <a:off x="5508339" y="6453051"/>
+            <a:ext cx="1175322" cy="307777"/>
+          </a:xfrm>
+          <a:prstGeom prst="rect">
+            <a:avLst/>
+          </a:prstGeom>
+          <a:noFill/>
+        </p:spPr>
+        <p:txBody>
+          <a:bodyPr wrap="none" rtlCol="0">
+            <a:spAutoFit/>
+          </a:bodyPr>
+          <a:lstStyle/>
+          <a:p>
+            <a:pPr algn="ctr"/>
+            <a:r>
+              <a:rPr lang="en-US" altLang="ko-KR" sz="1400" dirty="0">
+                <a:solidFill>
+                  <a:schemeClr val="tx1">
+                    <a:lumMod val="50000"/>
+                    <a:lumOff val="50000"/>
+                  </a:schemeClr>
+                </a:solidFill>
+                <a:latin typeface="카카오 Regular" panose="020B0600000101010101" pitchFamily="50" charset="-127"/>
+                <a:ea typeface="카카오 Regular" panose="020B0600000101010101" pitchFamily="50" charset="-127"/>
+              </a:rPr>
+              <a:t>2020.10.30.</a:t>
+            </a:r>
+            <a:endParaRPr lang="ko-KR" altLang="en-US" sz="1400" dirty="0">
+              <a:solidFill>
+                <a:schemeClr val="tx1">
+                  <a:lumMod val="50000"/>
+                  <a:lumOff val="50000"/>
+                </a:schemeClr>
+              </a:solidFill>
+              <a:latin typeface="카카오 Regular" panose="020B0600000101010101" pitchFamily="50" charset="-127"/>
+              <a:ea typeface="카카오 Regular" panose="020B0600000101010101" pitchFamily="50" charset="-127"/>
+            </a:endParaRPr>
+          </a:p>
+        </p:txBody>
+      </p:sp>
+      <p:sp>
+        <p:nvSpPr>
+          <p:cNvPr id="8" name="평행 사변형 7">
+            <a:extLst>
+              <a:ext uri="{FF2B5EF4-FFF2-40B4-BE49-F238E27FC236}">
+                <a16:creationId xmlns:a16="http://schemas.microsoft.com/office/drawing/2014/main" id="{32A976F4-7794-4D2A-B68C-ADE8375D6943}"/>
+              </a:ext>
+            </a:extLst>
+          </p:cNvPr>
+          <p:cNvSpPr/>
+          <p:nvPr/>
+        </p:nvSpPr>
+        <p:spPr>
+          <a:xfrm rot="21401711">
+            <a:off x="1311964" y="308491"/>
+            <a:ext cx="5467628" cy="584961"/>
+          </a:xfrm>
+          <a:prstGeom prst="parallelogram">
+            <a:avLst/>
+          </a:prstGeom>
+          <a:solidFill>
+            <a:schemeClr val="accent4">
+              <a:lumMod val="40000"/>
+              <a:lumOff val="60000"/>
+            </a:schemeClr>
+          </a:solidFill>
+          <a:ln>
+            <a:noFill/>
+          </a:ln>
+        </p:spPr>
+        <p:style>
+          <a:lnRef idx="2">
+            <a:schemeClr val="accent1">
+              <a:shade val="50000"/>
+            </a:schemeClr>
+          </a:lnRef>
+          <a:fillRef idx="1">
+            <a:schemeClr val="accent1"/>
+          </a:fillRef>
+          <a:effectRef idx="0">
+            <a:schemeClr val="accent1"/>
+          </a:effectRef>
+          <a:fontRef idx="minor">
+            <a:schemeClr val="lt1"/>
+          </a:fontRef>
+        </p:style>
+        <p:txBody>
+          <a:bodyPr rtlCol="0" anchor="ctr"/>
+          <a:lstStyle/>
+          <a:p>
+            <a:pPr algn="ctr"/>
+            <a:endParaRPr lang="ko-KR" altLang="en-US"/>
+          </a:p>
+        </p:txBody>
+      </p:sp>
+      <p:sp>
+        <p:nvSpPr>
+          <p:cNvPr id="9" name="제목 1">
+            <a:extLst>
+              <a:ext uri="{FF2B5EF4-FFF2-40B4-BE49-F238E27FC236}">
+                <a16:creationId xmlns:a16="http://schemas.microsoft.com/office/drawing/2014/main" id="{4E123F9F-CD1D-45C2-8122-E0C123E31B97}"/>
+              </a:ext>
+            </a:extLst>
+          </p:cNvPr>
+          <p:cNvSpPr txBox="1">
+            <a:spLocks/>
+          </p:cNvSpPr>
+          <p:nvPr/>
+        </p:nvSpPr>
+        <p:spPr>
+          <a:xfrm>
+            <a:off x="1296506" y="216796"/>
+            <a:ext cx="5664733" cy="832711"/>
+          </a:xfrm>
+          <a:prstGeom prst="rect">
+            <a:avLst/>
+          </a:prstGeom>
+          <a:noFill/>
+        </p:spPr>
+        <p:txBody>
+          <a:bodyPr vert="horz" lIns="91440" tIns="45720" rIns="91440" bIns="45720" rtlCol="0" anchor="ctr">
+            <a:normAutofit/>
+          </a:bodyPr>
+          <a:lstStyle>
+            <a:lvl1pPr algn="l" defTabSz="914400" rtl="0" eaLnBrk="1" latinLnBrk="1" hangingPunct="1">
+              <a:lnSpc>
+                <a:spcPct val="90000"/>
+              </a:lnSpc>
+              <a:spcBef>
+                <a:spcPct val="0"/>
+              </a:spcBef>
+              <a:buNone/>
+              <a:defRPr sz="4400" kern="1200">
+                <a:solidFill>
+                  <a:schemeClr val="tx1"/>
+                </a:solidFill>
+                <a:latin typeface="+mj-lt"/>
+                <a:ea typeface="+mj-ea"/>
+                <a:cs typeface="+mj-cs"/>
+              </a:defRPr>
+            </a:lvl1pPr>
+          </a:lstStyle>
+          <a:p>
+            <a:pPr algn="dist"/>
+            <a:r>
+              <a:rPr lang="en-US" altLang="ko-KR" dirty="0">
+                <a:solidFill>
+                  <a:schemeClr val="tx1">
+                    <a:lumMod val="85000"/>
+                    <a:lumOff val="15000"/>
+                  </a:schemeClr>
+                </a:solidFill>
+                <a:latin typeface="카카오 Regular" panose="020B0600000101010101" pitchFamily="50" charset="-127"/>
+                <a:ea typeface="카카오 Regular" panose="020B0600000101010101" pitchFamily="50" charset="-127"/>
+              </a:rPr>
+              <a:t>Service</a:t>
+            </a:r>
+            <a:r>
+              <a:rPr lang="ko-KR" altLang="en-US" dirty="0">
+                <a:solidFill>
+                  <a:schemeClr val="tx1">
+                    <a:lumMod val="85000"/>
+                    <a:lumOff val="15000"/>
+                  </a:schemeClr>
+                </a:solidFill>
+                <a:latin typeface="카카오 Regular" panose="020B0600000101010101" pitchFamily="50" charset="-127"/>
+                <a:ea typeface="카카오 Regular" panose="020B0600000101010101" pitchFamily="50" charset="-127"/>
+              </a:rPr>
+              <a:t> </a:t>
+            </a:r>
+            <a:r>
+              <a:rPr lang="en-US" altLang="ko-KR" dirty="0">
+                <a:solidFill>
+                  <a:schemeClr val="tx1">
+                    <a:lumMod val="85000"/>
+                    <a:lumOff val="15000"/>
+                  </a:schemeClr>
+                </a:solidFill>
+                <a:latin typeface="카카오 Regular" panose="020B0600000101010101" pitchFamily="50" charset="-127"/>
+                <a:ea typeface="카카오 Regular" panose="020B0600000101010101" pitchFamily="50" charset="-127"/>
+              </a:rPr>
+              <a:t>Procedure</a:t>
+            </a:r>
+            <a:endParaRPr lang="ko-KR" altLang="en-US" dirty="0">
+              <a:solidFill>
+                <a:schemeClr val="tx1">
+                  <a:lumMod val="85000"/>
+                  <a:lumOff val="15000"/>
+                </a:schemeClr>
+              </a:solidFill>
+              <a:latin typeface="카카오 Regular" panose="020B0600000101010101" pitchFamily="50" charset="-127"/>
+              <a:ea typeface="카카오 Regular" panose="020B0600000101010101" pitchFamily="50" charset="-127"/>
+            </a:endParaRPr>
+          </a:p>
+        </p:txBody>
+      </p:sp>
+      <p:sp>
+        <p:nvSpPr>
+          <p:cNvPr id="10" name="TextBox 9">
+            <a:extLst>
+              <a:ext uri="{FF2B5EF4-FFF2-40B4-BE49-F238E27FC236}">
+                <a16:creationId xmlns:a16="http://schemas.microsoft.com/office/drawing/2014/main" id="{67751F4E-1FEE-48FC-BD46-E2D190AA6A2B}"/>
+              </a:ext>
+            </a:extLst>
+          </p:cNvPr>
+          <p:cNvSpPr txBox="1"/>
+          <p:nvPr/>
+        </p:nvSpPr>
+        <p:spPr>
+          <a:xfrm>
+            <a:off x="271174" y="279208"/>
+            <a:ext cx="879564" cy="707886"/>
+          </a:xfrm>
+          <a:prstGeom prst="rect">
+            <a:avLst/>
+          </a:prstGeom>
+          <a:noFill/>
+        </p:spPr>
+        <p:txBody>
+          <a:bodyPr wrap="square" rtlCol="0">
+            <a:spAutoFit/>
+          </a:bodyPr>
+          <a:lstStyle/>
+          <a:p>
+            <a:pPr algn="dist"/>
+            <a:r>
+              <a:rPr lang="en-US" altLang="ko-KR" sz="4000" b="1" dirty="0">
+                <a:solidFill>
+                  <a:schemeClr val="bg1">
+                    <a:lumMod val="50000"/>
+                  </a:schemeClr>
+                </a:solidFill>
+                <a:latin typeface="카카오 Regular" panose="020B0600000101010101" pitchFamily="50" charset="-127"/>
+                <a:ea typeface="카카오 Regular" panose="020B0600000101010101" pitchFamily="50" charset="-127"/>
+              </a:rPr>
+              <a:t>06</a:t>
+            </a:r>
+            <a:endParaRPr lang="ko-KR" altLang="en-US" sz="4000" b="1" dirty="0">
+              <a:solidFill>
+                <a:schemeClr val="bg1">
+                  <a:lumMod val="50000"/>
+                </a:schemeClr>
+              </a:solidFill>
+              <a:latin typeface="카카오 Regular" panose="020B0600000101010101" pitchFamily="50" charset="-127"/>
+              <a:ea typeface="카카오 Regular" panose="020B0600000101010101" pitchFamily="50" charset="-127"/>
+            </a:endParaRPr>
+          </a:p>
+        </p:txBody>
+      </p:sp>
+      <p:pic>
+        <p:nvPicPr>
+          <p:cNvPr id="7" name="그림 6">
+            <a:extLst>
+              <a:ext uri="{FF2B5EF4-FFF2-40B4-BE49-F238E27FC236}">
+                <a16:creationId xmlns:a16="http://schemas.microsoft.com/office/drawing/2014/main" id="{E77BBC39-E7D2-4075-B181-F4DA8B685694}"/>
+              </a:ext>
+            </a:extLst>
+          </p:cNvPr>
+          <p:cNvPicPr>
+            <a:picLocks noChangeAspect="1"/>
+          </p:cNvPicPr>
+          <p:nvPr/>
+        </p:nvPicPr>
+        <p:blipFill>
+          <a:blip r:embed="rId3"/>
+          <a:stretch>
+            <a:fillRect/>
+          </a:stretch>
+        </p:blipFill>
+        <p:spPr>
+          <a:xfrm>
+            <a:off x="1932348" y="1396080"/>
+            <a:ext cx="8327303" cy="4705847"/>
+          </a:xfrm>
+          <a:prstGeom prst="rect">
+            <a:avLst/>
+          </a:prstGeom>
+        </p:spPr>
+      </p:pic>
+    </p:spTree>
+    <p:extLst>
+      <p:ext uri="{BB962C8B-B14F-4D97-AF65-F5344CB8AC3E}">
+        <p14:creationId xmlns:p14="http://schemas.microsoft.com/office/powerpoint/2010/main" val="2781598530"/>
+      </p:ext>
+    </p:extLst>
+  </p:cSld>
+  <p:clrMapOvr>
+    <a:masterClrMapping/>
+  </p:clrMapOvr>
+  <mc:AlternateContent xmlns:mc="http://schemas.openxmlformats.org/markup-compatibility/2006" xmlns:p14="http://schemas.microsoft.com/office/powerpoint/2010/main">
+    <mc:Choice Requires="p14">
+      <p:transition spd="med" p14:dur="700">
+        <p:fade/>
+      </p:transition>
+    </mc:Choice>
+    <mc:Fallback xmlns="">
+      <p:transition spd="med">
+        <p:fade/>
+      </p:transition>
+    </mc:Fallback>
+  </mc:AlternateContent>
+</p:sld>
+</file>
+
+<file path=ppt/slides/slide16.xml><?xml version="1.0" encoding="utf-8"?>
+<p:sld xmlns:a="http://schemas.openxmlformats.org/drawingml/2006/main" xmlns:r="http://schemas.openxmlformats.org/officeDocument/2006/relationships" xmlns:p="http://schemas.openxmlformats.org/presentationml/2006/main">
+  <p:cSld>
+    <p:spTree>
+      <p:nvGrpSpPr>
+        <p:cNvPr id="1" name=""/>
+        <p:cNvGrpSpPr/>
+        <p:nvPr/>
+      </p:nvGrpSpPr>
+      <p:grpSpPr>
+        <a:xfrm>
+          <a:off x="0" y="0"/>
+          <a:ext cx="0" cy="0"/>
+          <a:chOff x="0" y="0"/>
+          <a:chExt cx="0" cy="0"/>
+        </a:xfrm>
+      </p:grpSpPr>
+      <p:sp>
+        <p:nvSpPr>
+          <p:cNvPr id="4" name="TextBox 3">
+            <a:extLst>
+              <a:ext uri="{FF2B5EF4-FFF2-40B4-BE49-F238E27FC236}">
+                <a16:creationId xmlns:a16="http://schemas.microsoft.com/office/drawing/2014/main" id="{6AAAD052-7018-4B5E-ACE0-B4B9B5DADAA8}"/>
+              </a:ext>
+            </a:extLst>
+          </p:cNvPr>
+          <p:cNvSpPr txBox="1"/>
+          <p:nvPr/>
+        </p:nvSpPr>
+        <p:spPr>
+          <a:xfrm>
+            <a:off x="11541939" y="6453051"/>
+            <a:ext cx="562975" cy="307777"/>
+          </a:xfrm>
+          <a:prstGeom prst="rect">
+            <a:avLst/>
+          </a:prstGeom>
+          <a:noFill/>
+        </p:spPr>
+        <p:txBody>
+          <a:bodyPr wrap="none" rtlCol="0">
+            <a:spAutoFit/>
+          </a:bodyPr>
+          <a:lstStyle/>
+          <a:p>
+            <a:pPr algn="r"/>
+            <a:r>
+              <a:rPr lang="en-US" altLang="ko-KR" sz="1400" dirty="0">
+                <a:solidFill>
+                  <a:schemeClr val="tx1">
+                    <a:lumMod val="50000"/>
+                    <a:lumOff val="50000"/>
+                  </a:schemeClr>
+                </a:solidFill>
+                <a:latin typeface="카카오 Regular" panose="020B0600000101010101" pitchFamily="50" charset="-127"/>
+                <a:ea typeface="카카오 Regular" panose="020B0600000101010101" pitchFamily="50" charset="-127"/>
+              </a:rPr>
+              <a:t>p. 16</a:t>
+            </a:r>
+            <a:endParaRPr lang="ko-KR" altLang="en-US" sz="1400" dirty="0">
+              <a:solidFill>
+                <a:schemeClr val="tx1">
+                  <a:lumMod val="50000"/>
+                  <a:lumOff val="50000"/>
+                </a:schemeClr>
+              </a:solidFill>
+              <a:latin typeface="카카오 Regular" panose="020B0600000101010101" pitchFamily="50" charset="-127"/>
+              <a:ea typeface="카카오 Regular" panose="020B0600000101010101" pitchFamily="50" charset="-127"/>
+            </a:endParaRPr>
+          </a:p>
+        </p:txBody>
+      </p:sp>
+      <p:sp>
+        <p:nvSpPr>
+          <p:cNvPr id="5" name="TextBox 4">
+            <a:extLst>
+              <a:ext uri="{FF2B5EF4-FFF2-40B4-BE49-F238E27FC236}">
+                <a16:creationId xmlns:a16="http://schemas.microsoft.com/office/drawing/2014/main" id="{4954B042-D712-468F-8BF0-BB42376DFC5E}"/>
+              </a:ext>
+            </a:extLst>
+          </p:cNvPr>
+          <p:cNvSpPr txBox="1"/>
+          <p:nvPr/>
+        </p:nvSpPr>
+        <p:spPr>
+          <a:xfrm>
+            <a:off x="87086" y="6453051"/>
+            <a:ext cx="1356462" cy="307777"/>
+          </a:xfrm>
+          <a:prstGeom prst="rect">
+            <a:avLst/>
+          </a:prstGeom>
+          <a:noFill/>
+        </p:spPr>
+        <p:txBody>
+          <a:bodyPr wrap="none" rtlCol="0">
+            <a:spAutoFit/>
+          </a:bodyPr>
+          <a:lstStyle/>
+          <a:p>
+            <a:r>
+              <a:rPr lang="ko-KR" altLang="en-US" sz="1400" dirty="0">
+                <a:solidFill>
+                  <a:schemeClr val="tx1">
+                    <a:lumMod val="50000"/>
+                    <a:lumOff val="50000"/>
+                  </a:schemeClr>
+                </a:solidFill>
+                <a:latin typeface="카카오 Regular" panose="020B0600000101010101" pitchFamily="50" charset="-127"/>
+                <a:ea typeface="카카오 Regular" panose="020B0600000101010101" pitchFamily="50" charset="-127"/>
+              </a:rPr>
+              <a:t>오픈소스</a:t>
+            </a:r>
+            <a:r>
+              <a:rPr lang="en-US" altLang="ko-KR" sz="1400" dirty="0">
+                <a:solidFill>
+                  <a:schemeClr val="tx1">
+                    <a:lumMod val="50000"/>
+                    <a:lumOff val="50000"/>
+                  </a:schemeClr>
+                </a:solidFill>
+                <a:latin typeface="카카오 Regular" panose="020B0600000101010101" pitchFamily="50" charset="-127"/>
+                <a:ea typeface="카카오 Regular" panose="020B0600000101010101" pitchFamily="50" charset="-127"/>
+              </a:rPr>
+              <a:t>SW</a:t>
+            </a:r>
+            <a:r>
+              <a:rPr lang="ko-KR" altLang="en-US" sz="1400" dirty="0">
+                <a:solidFill>
+                  <a:schemeClr val="tx1">
+                    <a:lumMod val="50000"/>
+                    <a:lumOff val="50000"/>
+                  </a:schemeClr>
+                </a:solidFill>
+                <a:latin typeface="카카오 Regular" panose="020B0600000101010101" pitchFamily="50" charset="-127"/>
+                <a:ea typeface="카카오 Regular" panose="020B0600000101010101" pitchFamily="50" charset="-127"/>
+              </a:rPr>
+              <a:t>설계</a:t>
+            </a:r>
+          </a:p>
+        </p:txBody>
+      </p:sp>
+      <p:sp>
+        <p:nvSpPr>
+          <p:cNvPr id="6" name="TextBox 5">
+            <a:extLst>
+              <a:ext uri="{FF2B5EF4-FFF2-40B4-BE49-F238E27FC236}">
+                <a16:creationId xmlns:a16="http://schemas.microsoft.com/office/drawing/2014/main" id="{B3DB57B7-8AEA-41FC-94CD-E72818DD6FEF}"/>
+              </a:ext>
+            </a:extLst>
+          </p:cNvPr>
+          <p:cNvSpPr txBox="1"/>
+          <p:nvPr/>
+        </p:nvSpPr>
+        <p:spPr>
+          <a:xfrm>
+            <a:off x="5508339" y="6453051"/>
+            <a:ext cx="1175322" cy="307777"/>
+          </a:xfrm>
+          <a:prstGeom prst="rect">
+            <a:avLst/>
+          </a:prstGeom>
+          <a:noFill/>
+        </p:spPr>
+        <p:txBody>
+          <a:bodyPr wrap="none" rtlCol="0">
+            <a:spAutoFit/>
+          </a:bodyPr>
+          <a:lstStyle/>
+          <a:p>
+            <a:pPr algn="ctr"/>
+            <a:r>
+              <a:rPr lang="en-US" altLang="ko-KR" sz="1400" dirty="0">
+                <a:solidFill>
+                  <a:schemeClr val="tx1">
+                    <a:lumMod val="50000"/>
+                    <a:lumOff val="50000"/>
+                  </a:schemeClr>
+                </a:solidFill>
+                <a:latin typeface="카카오 Regular" panose="020B0600000101010101" pitchFamily="50" charset="-127"/>
+                <a:ea typeface="카카오 Regular" panose="020B0600000101010101" pitchFamily="50" charset="-127"/>
+              </a:rPr>
+              <a:t>2020.10.30.</a:t>
+            </a:r>
+            <a:endParaRPr lang="ko-KR" altLang="en-US" sz="1400" dirty="0">
+              <a:solidFill>
+                <a:schemeClr val="tx1">
+                  <a:lumMod val="50000"/>
+                  <a:lumOff val="50000"/>
+                </a:schemeClr>
+              </a:solidFill>
+              <a:latin typeface="카카오 Regular" panose="020B0600000101010101" pitchFamily="50" charset="-127"/>
+              <a:ea typeface="카카오 Regular" panose="020B0600000101010101" pitchFamily="50" charset="-127"/>
+            </a:endParaRPr>
+          </a:p>
+        </p:txBody>
+      </p:sp>
+      <p:sp>
+        <p:nvSpPr>
+          <p:cNvPr id="8" name="평행 사변형 7">
+            <a:extLst>
+              <a:ext uri="{FF2B5EF4-FFF2-40B4-BE49-F238E27FC236}">
+                <a16:creationId xmlns:a16="http://schemas.microsoft.com/office/drawing/2014/main" id="{32A976F4-7794-4D2A-B68C-ADE8375D6943}"/>
+              </a:ext>
+            </a:extLst>
+          </p:cNvPr>
+          <p:cNvSpPr/>
+          <p:nvPr/>
+        </p:nvSpPr>
+        <p:spPr>
+          <a:xfrm rot="21401711">
+            <a:off x="1313193" y="351064"/>
+            <a:ext cx="3990616" cy="584961"/>
+          </a:xfrm>
+          <a:prstGeom prst="parallelogram">
+            <a:avLst/>
+          </a:prstGeom>
+          <a:solidFill>
+            <a:schemeClr val="accent4">
+              <a:lumMod val="40000"/>
+              <a:lumOff val="60000"/>
+            </a:schemeClr>
+          </a:solidFill>
+          <a:ln>
+            <a:noFill/>
+          </a:ln>
+        </p:spPr>
+        <p:style>
+          <a:lnRef idx="2">
+            <a:schemeClr val="accent1">
+              <a:shade val="50000"/>
+            </a:schemeClr>
+          </a:lnRef>
+          <a:fillRef idx="1">
+            <a:schemeClr val="accent1"/>
+          </a:fillRef>
+          <a:effectRef idx="0">
+            <a:schemeClr val="accent1"/>
+          </a:effectRef>
+          <a:fontRef idx="minor">
+            <a:schemeClr val="lt1"/>
+          </a:fontRef>
+        </p:style>
+        <p:txBody>
+          <a:bodyPr rtlCol="0" anchor="ctr"/>
+          <a:lstStyle/>
+          <a:p>
+            <a:pPr algn="ctr"/>
+            <a:endParaRPr lang="ko-KR" altLang="en-US"/>
+          </a:p>
+        </p:txBody>
+      </p:sp>
+      <p:sp>
+        <p:nvSpPr>
+          <p:cNvPr id="9" name="제목 1">
+            <a:extLst>
+              <a:ext uri="{FF2B5EF4-FFF2-40B4-BE49-F238E27FC236}">
+                <a16:creationId xmlns:a16="http://schemas.microsoft.com/office/drawing/2014/main" id="{4E123F9F-CD1D-45C2-8122-E0C123E31B97}"/>
+              </a:ext>
+            </a:extLst>
+          </p:cNvPr>
+          <p:cNvSpPr txBox="1">
+            <a:spLocks/>
+          </p:cNvSpPr>
+          <p:nvPr/>
+        </p:nvSpPr>
+        <p:spPr>
+          <a:xfrm>
+            <a:off x="1296507" y="216796"/>
+            <a:ext cx="4134476" cy="832711"/>
+          </a:xfrm>
+          <a:prstGeom prst="rect">
+            <a:avLst/>
+          </a:prstGeom>
+          <a:noFill/>
+        </p:spPr>
+        <p:txBody>
+          <a:bodyPr vert="horz" lIns="91440" tIns="45720" rIns="91440" bIns="45720" rtlCol="0" anchor="ctr">
+            <a:normAutofit/>
+          </a:bodyPr>
+          <a:lstStyle>
+            <a:lvl1pPr algn="l" defTabSz="914400" rtl="0" eaLnBrk="1" latinLnBrk="1" hangingPunct="1">
+              <a:lnSpc>
+                <a:spcPct val="90000"/>
+              </a:lnSpc>
+              <a:spcBef>
+                <a:spcPct val="0"/>
+              </a:spcBef>
+              <a:buNone/>
+              <a:defRPr sz="4400" kern="1200">
+                <a:solidFill>
+                  <a:schemeClr val="tx1"/>
+                </a:solidFill>
+                <a:latin typeface="+mj-lt"/>
+                <a:ea typeface="+mj-ea"/>
+                <a:cs typeface="+mj-cs"/>
+              </a:defRPr>
+            </a:lvl1pPr>
+          </a:lstStyle>
+          <a:p>
+            <a:pPr algn="dist"/>
+            <a:r>
+              <a:rPr lang="en-US" altLang="ko-KR" dirty="0">
+                <a:solidFill>
+                  <a:schemeClr val="tx1">
+                    <a:lumMod val="85000"/>
+                    <a:lumOff val="15000"/>
+                  </a:schemeClr>
+                </a:solidFill>
+                <a:latin typeface="카카오 Regular" panose="020B0600000101010101" pitchFamily="50" charset="-127"/>
+                <a:ea typeface="카카오 Regular" panose="020B0600000101010101" pitchFamily="50" charset="-127"/>
+              </a:rPr>
+              <a:t>Upcoming Plan</a:t>
+            </a:r>
+            <a:endParaRPr lang="ko-KR" altLang="en-US" dirty="0">
+              <a:solidFill>
+                <a:schemeClr val="tx1">
+                  <a:lumMod val="85000"/>
+                  <a:lumOff val="15000"/>
+                </a:schemeClr>
+              </a:solidFill>
+              <a:latin typeface="카카오 Regular" panose="020B0600000101010101" pitchFamily="50" charset="-127"/>
+              <a:ea typeface="카카오 Regular" panose="020B0600000101010101" pitchFamily="50" charset="-127"/>
+            </a:endParaRPr>
+          </a:p>
+        </p:txBody>
+      </p:sp>
+      <p:sp>
+        <p:nvSpPr>
+          <p:cNvPr id="10" name="TextBox 9">
+            <a:extLst>
+              <a:ext uri="{FF2B5EF4-FFF2-40B4-BE49-F238E27FC236}">
+                <a16:creationId xmlns:a16="http://schemas.microsoft.com/office/drawing/2014/main" id="{67751F4E-1FEE-48FC-BD46-E2D190AA6A2B}"/>
+              </a:ext>
+            </a:extLst>
+          </p:cNvPr>
+          <p:cNvSpPr txBox="1"/>
+          <p:nvPr/>
+        </p:nvSpPr>
+        <p:spPr>
+          <a:xfrm>
+            <a:off x="271174" y="279208"/>
+            <a:ext cx="879564" cy="707886"/>
+          </a:xfrm>
+          <a:prstGeom prst="rect">
+            <a:avLst/>
+          </a:prstGeom>
+          <a:noFill/>
+        </p:spPr>
+        <p:txBody>
+          <a:bodyPr wrap="square" rtlCol="0">
+            <a:spAutoFit/>
+          </a:bodyPr>
+          <a:lstStyle/>
+          <a:p>
+            <a:pPr algn="dist"/>
+            <a:r>
+              <a:rPr lang="en-US" altLang="ko-KR" sz="4000" b="1" dirty="0">
+                <a:solidFill>
+                  <a:schemeClr val="bg1">
+                    <a:lumMod val="50000"/>
+                  </a:schemeClr>
+                </a:solidFill>
+                <a:latin typeface="카카오 Regular" panose="020B0600000101010101" pitchFamily="50" charset="-127"/>
+                <a:ea typeface="카카오 Regular" panose="020B0600000101010101" pitchFamily="50" charset="-127"/>
+              </a:rPr>
+              <a:t>07</a:t>
+            </a:r>
+            <a:endParaRPr lang="ko-KR" altLang="en-US" sz="4000" b="1" dirty="0">
+              <a:solidFill>
+                <a:schemeClr val="bg1">
+                  <a:lumMod val="50000"/>
+                </a:schemeClr>
+              </a:solidFill>
+              <a:latin typeface="카카오 Regular" panose="020B0600000101010101" pitchFamily="50" charset="-127"/>
+              <a:ea typeface="카카오 Regular" panose="020B0600000101010101" pitchFamily="50" charset="-127"/>
+            </a:endParaRPr>
+          </a:p>
+        </p:txBody>
+      </p:sp>
+      <p:pic>
+        <p:nvPicPr>
+          <p:cNvPr id="13" name="그림 12">
+            <a:extLst>
+              <a:ext uri="{FF2B5EF4-FFF2-40B4-BE49-F238E27FC236}">
+                <a16:creationId xmlns:a16="http://schemas.microsoft.com/office/drawing/2014/main" id="{C598EAF4-0CAF-4FC6-85D5-C80A51A54AAC}"/>
+              </a:ext>
+            </a:extLst>
+          </p:cNvPr>
+          <p:cNvPicPr>
+            <a:picLocks noChangeAspect="1"/>
+          </p:cNvPicPr>
+          <p:nvPr/>
+        </p:nvPicPr>
+        <p:blipFill>
+          <a:blip r:embed="rId3"/>
+          <a:stretch>
+            <a:fillRect/>
+          </a:stretch>
+        </p:blipFill>
+        <p:spPr>
+          <a:xfrm>
+            <a:off x="102922" y="1654915"/>
+            <a:ext cx="11986156" cy="4130314"/>
+          </a:xfrm>
+          <a:prstGeom prst="rect">
+            <a:avLst/>
+          </a:prstGeom>
+        </p:spPr>
+      </p:pic>
+    </p:spTree>
+    <p:extLst>
+      <p:ext uri="{BB962C8B-B14F-4D97-AF65-F5344CB8AC3E}">
+        <p14:creationId xmlns:p14="http://schemas.microsoft.com/office/powerpoint/2010/main" val="4241773470"/>
+      </p:ext>
+    </p:extLst>
+  </p:cSld>
+  <p:clrMapOvr>
+    <a:masterClrMapping/>
+  </p:clrMapOvr>
+  <mc:AlternateContent xmlns:mc="http://schemas.openxmlformats.org/markup-compatibility/2006" xmlns:p14="http://schemas.microsoft.com/office/powerpoint/2010/main">
+    <mc:Choice Requires="p14">
+      <p:transition spd="med" p14:dur="700">
+        <p:fade/>
+      </p:transition>
+    </mc:Choice>
+    <mc:Fallback xmlns="">
+      <p:transition spd="med">
+        <p:fade/>
+      </p:transition>
+    </mc:Fallback>
+  </mc:AlternateContent>
+</p:sld>
+</file>
+
+<file path=ppt/slides/slide17.xml><?xml version="1.0" encoding="utf-8"?>
+<p:sld xmlns:a="http://schemas.openxmlformats.org/drawingml/2006/main" xmlns:r="http://schemas.openxmlformats.org/officeDocument/2006/relationships" xmlns:p="http://schemas.openxmlformats.org/presentationml/2006/main">
+  <p:cSld>
+    <p:spTree>
+      <p:nvGrpSpPr>
+        <p:cNvPr id="1" name=""/>
+        <p:cNvGrpSpPr/>
+        <p:nvPr/>
+      </p:nvGrpSpPr>
+      <p:grpSpPr>
+        <a:xfrm>
+          <a:off x="0" y="0"/>
+          <a:ext cx="0" cy="0"/>
+          <a:chOff x="0" y="0"/>
+          <a:chExt cx="0" cy="0"/>
+        </a:xfrm>
+      </p:grpSpPr>
+      <p:grpSp>
+        <p:nvGrpSpPr>
+          <p:cNvPr id="14" name="그룹 13">
+            <a:extLst>
+              <a:ext uri="{FF2B5EF4-FFF2-40B4-BE49-F238E27FC236}">
+                <a16:creationId xmlns:a16="http://schemas.microsoft.com/office/drawing/2014/main" id="{B91C2795-A13D-41C5-9297-D1321EBCDC8C}"/>
+              </a:ext>
+            </a:extLst>
+          </p:cNvPr>
+          <p:cNvGrpSpPr/>
+          <p:nvPr/>
+        </p:nvGrpSpPr>
+        <p:grpSpPr>
+          <a:xfrm>
+            <a:off x="3613594" y="1975252"/>
+            <a:ext cx="4964812" cy="2907496"/>
+            <a:chOff x="3613594" y="1887506"/>
+            <a:chExt cx="4964812" cy="2907496"/>
+          </a:xfrm>
+        </p:grpSpPr>
+        <p:grpSp>
+          <p:nvGrpSpPr>
+            <p:cNvPr id="2" name="그룹 1">
+              <a:extLst>
+                <a:ext uri="{FF2B5EF4-FFF2-40B4-BE49-F238E27FC236}">
+                  <a16:creationId xmlns:a16="http://schemas.microsoft.com/office/drawing/2014/main" id="{4C5023B3-CBC1-4630-919D-97A70213631B}"/>
+                </a:ext>
+              </a:extLst>
+            </p:cNvPr>
+            <p:cNvGrpSpPr/>
+            <p:nvPr/>
+          </p:nvGrpSpPr>
+          <p:grpSpPr>
+            <a:xfrm>
+              <a:off x="4028762" y="3962291"/>
+              <a:ext cx="4134476" cy="832711"/>
+              <a:chOff x="3827272" y="2839923"/>
+              <a:chExt cx="4134476" cy="832711"/>
+            </a:xfrm>
+          </p:grpSpPr>
+          <p:sp>
+            <p:nvSpPr>
+              <p:cNvPr id="8" name="평행 사변형 7">
+                <a:extLst>
+                  <a:ext uri="{FF2B5EF4-FFF2-40B4-BE49-F238E27FC236}">
+                    <a16:creationId xmlns:a16="http://schemas.microsoft.com/office/drawing/2014/main" id="{32A976F4-7794-4D2A-B68C-ADE8375D6943}"/>
+                  </a:ext>
+                </a:extLst>
+              </p:cNvPr>
+              <p:cNvSpPr/>
+              <p:nvPr/>
+            </p:nvSpPr>
+            <p:spPr>
+              <a:xfrm rot="21401711">
+                <a:off x="3843958" y="2974191"/>
+                <a:ext cx="3990616" cy="584961"/>
+              </a:xfrm>
+              <a:prstGeom prst="parallelogram">
+                <a:avLst/>
+              </a:prstGeom>
+              <a:solidFill>
+                <a:schemeClr val="accent4">
+                  <a:lumMod val="40000"/>
+                  <a:lumOff val="60000"/>
+                </a:schemeClr>
+              </a:solidFill>
+              <a:ln>
+                <a:noFill/>
+              </a:ln>
+            </p:spPr>
+            <p:style>
+              <a:lnRef idx="2">
+                <a:schemeClr val="accent1">
+                  <a:shade val="50000"/>
+                </a:schemeClr>
+              </a:lnRef>
+              <a:fillRef idx="1">
+                <a:schemeClr val="accent1"/>
+              </a:fillRef>
+              <a:effectRef idx="0">
+                <a:schemeClr val="accent1"/>
+              </a:effectRef>
+              <a:fontRef idx="minor">
+                <a:schemeClr val="lt1"/>
+              </a:fontRef>
+            </p:style>
+            <p:txBody>
+              <a:bodyPr rtlCol="0" anchor="ctr"/>
+              <a:lstStyle/>
+              <a:p>
+                <a:pPr algn="ctr"/>
+                <a:endParaRPr lang="ko-KR" altLang="en-US"/>
+              </a:p>
+            </p:txBody>
+          </p:sp>
+          <p:sp>
+            <p:nvSpPr>
+              <p:cNvPr id="9" name="제목 1">
+                <a:extLst>
+                  <a:ext uri="{FF2B5EF4-FFF2-40B4-BE49-F238E27FC236}">
+                    <a16:creationId xmlns:a16="http://schemas.microsoft.com/office/drawing/2014/main" id="{4E123F9F-CD1D-45C2-8122-E0C123E31B97}"/>
+                  </a:ext>
+                </a:extLst>
+              </p:cNvPr>
+              <p:cNvSpPr txBox="1">
+                <a:spLocks/>
+              </p:cNvSpPr>
+              <p:nvPr/>
+            </p:nvSpPr>
+            <p:spPr>
+              <a:xfrm>
+                <a:off x="3827272" y="2839923"/>
+                <a:ext cx="4134476" cy="832711"/>
+              </a:xfrm>
+              <a:prstGeom prst="rect">
+                <a:avLst/>
+              </a:prstGeom>
+              <a:noFill/>
+            </p:spPr>
+            <p:txBody>
+              <a:bodyPr vert="horz" lIns="91440" tIns="45720" rIns="91440" bIns="45720" rtlCol="0" anchor="ctr">
+                <a:normAutofit/>
+              </a:bodyPr>
+              <a:lstStyle>
+                <a:lvl1pPr algn="l" defTabSz="914400" rtl="0" eaLnBrk="1" latinLnBrk="1" hangingPunct="1">
+                  <a:lnSpc>
+                    <a:spcPct val="90000"/>
+                  </a:lnSpc>
+                  <a:spcBef>
+                    <a:spcPct val="0"/>
+                  </a:spcBef>
+                  <a:buNone/>
+                  <a:defRPr sz="4400" kern="1200">
+                    <a:solidFill>
+                      <a:schemeClr val="tx1"/>
+                    </a:solidFill>
+                    <a:latin typeface="+mj-lt"/>
+                    <a:ea typeface="+mj-ea"/>
+                    <a:cs typeface="+mj-cs"/>
+                  </a:defRPr>
+                </a:lvl1pPr>
+              </a:lstStyle>
+              <a:p>
+                <a:pPr algn="dist"/>
+                <a:r>
+                  <a:rPr lang="ko-KR" altLang="en-US" dirty="0">
+                    <a:solidFill>
+                      <a:schemeClr val="tx1">
+                        <a:lumMod val="85000"/>
+                        <a:lumOff val="15000"/>
+                      </a:schemeClr>
+                    </a:solidFill>
+                    <a:latin typeface="카카오 Regular" panose="020B0600000101010101" pitchFamily="50" charset="-127"/>
+                    <a:ea typeface="카카오 Regular" panose="020B0600000101010101" pitchFamily="50" charset="-127"/>
+                  </a:rPr>
+                  <a:t>감사합니다</a:t>
+                </a:r>
+              </a:p>
+            </p:txBody>
+          </p:sp>
+        </p:grpSp>
+        <p:grpSp>
+          <p:nvGrpSpPr>
+            <p:cNvPr id="3" name="그룹 2">
+              <a:extLst>
+                <a:ext uri="{FF2B5EF4-FFF2-40B4-BE49-F238E27FC236}">
+                  <a16:creationId xmlns:a16="http://schemas.microsoft.com/office/drawing/2014/main" id="{EF6BC996-8F2F-4E37-9FB9-791F1E4369D9}"/>
+                </a:ext>
+              </a:extLst>
+            </p:cNvPr>
+            <p:cNvGrpSpPr/>
+            <p:nvPr/>
+          </p:nvGrpSpPr>
+          <p:grpSpPr>
+            <a:xfrm>
+              <a:off x="3613594" y="1887506"/>
+              <a:ext cx="4964812" cy="1826659"/>
+              <a:chOff x="3167742" y="1784758"/>
+              <a:chExt cx="5856514" cy="2154735"/>
+            </a:xfrm>
+          </p:grpSpPr>
+          <p:sp>
+            <p:nvSpPr>
+              <p:cNvPr id="11" name="직사각형 10">
+                <a:extLst>
+                  <a:ext uri="{FF2B5EF4-FFF2-40B4-BE49-F238E27FC236}">
+                    <a16:creationId xmlns:a16="http://schemas.microsoft.com/office/drawing/2014/main" id="{5592D153-0D67-4B62-B14D-846CCB92C3EB}"/>
+                  </a:ext>
+                </a:extLst>
+              </p:cNvPr>
+              <p:cNvSpPr/>
+              <p:nvPr/>
+            </p:nvSpPr>
+            <p:spPr>
+              <a:xfrm>
+                <a:off x="7343502" y="1784758"/>
+                <a:ext cx="1680754" cy="1680754"/>
+              </a:xfrm>
+              <a:prstGeom prst="rect">
+                <a:avLst/>
+              </a:prstGeom>
+              <a:noFill/>
+              <a:ln w="57150">
+                <a:solidFill>
+                  <a:schemeClr val="accent4"/>
+                </a:solidFill>
+              </a:ln>
+            </p:spPr>
+            <p:style>
+              <a:lnRef idx="2">
+                <a:schemeClr val="accent1">
+                  <a:shade val="50000"/>
+                </a:schemeClr>
+              </a:lnRef>
+              <a:fillRef idx="1">
+                <a:schemeClr val="accent1"/>
+              </a:fillRef>
+              <a:effectRef idx="0">
+                <a:schemeClr val="accent1"/>
+              </a:effectRef>
+              <a:fontRef idx="minor">
+                <a:schemeClr val="lt1"/>
+              </a:fontRef>
+            </p:style>
+            <p:txBody>
+              <a:bodyPr rtlCol="0" anchor="ctr"/>
+              <a:lstStyle/>
+              <a:p>
+                <a:pPr algn="ctr"/>
+                <a:endParaRPr lang="ko-KR" altLang="en-US"/>
+              </a:p>
+            </p:txBody>
+          </p:sp>
+          <p:sp>
+            <p:nvSpPr>
+              <p:cNvPr id="12" name="제목 1">
+                <a:extLst>
+                  <a:ext uri="{FF2B5EF4-FFF2-40B4-BE49-F238E27FC236}">
+                    <a16:creationId xmlns:a16="http://schemas.microsoft.com/office/drawing/2014/main" id="{4B153EED-3715-4069-B6E8-794B1D396523}"/>
+                  </a:ext>
+                </a:extLst>
+              </p:cNvPr>
+              <p:cNvSpPr txBox="1">
+                <a:spLocks/>
+              </p:cNvSpPr>
+              <p:nvPr/>
+            </p:nvSpPr>
+            <p:spPr>
+              <a:xfrm>
+                <a:off x="3167742" y="2258737"/>
+                <a:ext cx="5366780" cy="1680756"/>
+              </a:xfrm>
+              <a:prstGeom prst="rect">
+                <a:avLst/>
+              </a:prstGeom>
+              <a:solidFill>
+                <a:schemeClr val="bg1"/>
+              </a:solidFill>
+            </p:spPr>
+            <p:txBody>
+              <a:bodyPr vert="horz" lIns="91440" tIns="45720" rIns="91440" bIns="45720" rtlCol="0" anchor="ctr">
+                <a:normAutofit fontScale="77500" lnSpcReduction="20000"/>
+              </a:bodyPr>
+              <a:lstStyle>
+                <a:lvl1pPr algn="l" defTabSz="914400" rtl="0" eaLnBrk="1" latinLnBrk="1" hangingPunct="1">
+                  <a:lnSpc>
+                    <a:spcPct val="90000"/>
+                  </a:lnSpc>
+                  <a:spcBef>
+                    <a:spcPct val="0"/>
+                  </a:spcBef>
+                  <a:buNone/>
+                  <a:defRPr sz="4400" kern="1200">
+                    <a:solidFill>
+                      <a:schemeClr val="tx1"/>
+                    </a:solidFill>
+                    <a:latin typeface="+mj-lt"/>
+                    <a:ea typeface="+mj-ea"/>
+                    <a:cs typeface="+mj-cs"/>
+                  </a:defRPr>
+                </a:lvl1pPr>
+              </a:lstStyle>
+              <a:p>
+                <a:pPr algn="dist">
+                  <a:lnSpc>
+                    <a:spcPct val="120000"/>
+                  </a:lnSpc>
+                </a:pPr>
+                <a:r>
+                  <a:rPr lang="en-US" altLang="ko-KR" sz="5400" dirty="0">
+                    <a:solidFill>
+                      <a:schemeClr val="tx1">
+                        <a:lumMod val="85000"/>
+                        <a:lumOff val="15000"/>
+                      </a:schemeClr>
+                    </a:solidFill>
+                    <a:latin typeface="카카오 Regular" panose="020B0600000101010101" pitchFamily="50" charset="-127"/>
+                    <a:ea typeface="카카오 Regular" panose="020B0600000101010101" pitchFamily="50" charset="-127"/>
+                  </a:rPr>
+                  <a:t>Team 1</a:t>
+                </a:r>
+              </a:p>
+              <a:p>
+                <a:pPr algn="dist">
+                  <a:lnSpc>
+                    <a:spcPct val="120000"/>
+                  </a:lnSpc>
+                </a:pPr>
+                <a:r>
+                  <a:rPr lang="ko-KR" altLang="en-US" sz="5400" dirty="0">
+                    <a:solidFill>
+                      <a:schemeClr val="tx1">
+                        <a:lumMod val="85000"/>
+                        <a:lumOff val="15000"/>
+                      </a:schemeClr>
+                    </a:solidFill>
+                    <a:latin typeface="카카오 Regular" panose="020B0600000101010101" pitchFamily="50" charset="-127"/>
+                    <a:ea typeface="카카오 Regular" panose="020B0600000101010101" pitchFamily="50" charset="-127"/>
+                  </a:rPr>
+                  <a:t>두리번두리번</a:t>
+                </a:r>
+              </a:p>
+            </p:txBody>
+          </p:sp>
+        </p:grpSp>
+      </p:grpSp>
+    </p:spTree>
+    <p:extLst>
+      <p:ext uri="{BB962C8B-B14F-4D97-AF65-F5344CB8AC3E}">
+        <p14:creationId xmlns:p14="http://schemas.microsoft.com/office/powerpoint/2010/main" val="2565081278"/>
+      </p:ext>
+    </p:extLst>
+  </p:cSld>
+  <p:clrMapOvr>
+    <a:masterClrMapping/>
+  </p:clrMapOvr>
+  <mc:AlternateContent xmlns:mc="http://schemas.openxmlformats.org/markup-compatibility/2006" xmlns:p14="http://schemas.microsoft.com/office/powerpoint/2010/main">
+    <mc:Choice Requires="p14">
+      <p:transition spd="med" p14:dur="700">
+        <p:fade/>
+      </p:transition>
+    </mc:Choice>
+    <mc:Fallback xmlns="">
       <p:transition spd="med">
         <p:fade/>
       </p:transition>

</xml_diff>